<commit_message>
WIP. Added saveFakeResponse. Extracted executeRequest.
</commit_message>
<xml_diff>
--- a/wireframes.pptx
+++ b/wireframes.pptx
@@ -6,6 +6,7 @@
   </p:sldMasterIdLst>
   <p:sldIdLst>
     <p:sldId id="256" r:id="rId2"/>
+    <p:sldId id="257" r:id="rId3"/>
   </p:sldIdLst>
   <p:sldSz cx="12192000" cy="6858000"/>
   <p:notesSz cx="6858000" cy="9144000"/>
@@ -3323,58 +3324,1326 @@
       </p:grpSpPr>
       <p:sp>
         <p:nvSpPr>
-          <p:cNvPr id="2" name="Title 1">
-            <a:extLst>
-              <a:ext uri="{FF2B5EF4-FFF2-40B4-BE49-F238E27FC236}">
-                <a16:creationId xmlns:a16="http://schemas.microsoft.com/office/drawing/2014/main" id="{72FDF2A7-7C62-2059-DFCC-387EE31F556A}"/>
-              </a:ext>
-            </a:extLst>
-          </p:cNvPr>
-          <p:cNvSpPr>
-            <a:spLocks noGrp="1"/>
-          </p:cNvSpPr>
-          <p:nvPr>
-            <p:ph type="ctrTitle"/>
-          </p:nvPr>
-        </p:nvSpPr>
-        <p:spPr/>
-        <p:txBody>
-          <a:bodyPr/>
-          <a:lstStyle/>
-          <a:p>
+          <p:cNvPr id="4" name="TextBox 3">
+            <a:extLst>
+              <a:ext uri="{FF2B5EF4-FFF2-40B4-BE49-F238E27FC236}">
+                <a16:creationId xmlns:a16="http://schemas.microsoft.com/office/drawing/2014/main" id="{33DCCC11-2654-0525-10EB-19BDD285E500}"/>
+              </a:ext>
+            </a:extLst>
+          </p:cNvPr>
+          <p:cNvSpPr txBox="1"/>
+          <p:nvPr/>
+        </p:nvSpPr>
+        <p:spPr>
+          <a:xfrm>
+            <a:off x="738554" y="457200"/>
+            <a:ext cx="5326138" cy="369332"/>
+          </a:xfrm>
+          <a:prstGeom prst="rect">
+            <a:avLst/>
+          </a:prstGeom>
+          <a:noFill/>
+        </p:spPr>
+        <p:txBody>
+          <a:bodyPr wrap="none" rtlCol="0">
+            <a:spAutoFit/>
+          </a:bodyPr>
+          <a:lstStyle/>
+          <a:p>
+            <a:r>
+              <a:rPr lang="en-US"/>
+              <a:t>Initial screen (after login, which happens on startup)</a:t>
+            </a:r>
+          </a:p>
+        </p:txBody>
+      </p:sp>
+      <p:sp>
+        <p:nvSpPr>
+          <p:cNvPr id="5" name="Rectangle 4">
+            <a:extLst>
+              <a:ext uri="{FF2B5EF4-FFF2-40B4-BE49-F238E27FC236}">
+                <a16:creationId xmlns:a16="http://schemas.microsoft.com/office/drawing/2014/main" id="{71A4C750-1400-B96D-6DB8-5FFDF4320B86}"/>
+              </a:ext>
+            </a:extLst>
+          </p:cNvPr>
+          <p:cNvSpPr/>
+          <p:nvPr/>
+        </p:nvSpPr>
+        <p:spPr>
+          <a:xfrm>
+            <a:off x="2729515" y="1132449"/>
+            <a:ext cx="5176624" cy="4593102"/>
+          </a:xfrm>
+          <a:prstGeom prst="rect">
+            <a:avLst/>
+          </a:prstGeom>
+          <a:noFill/>
+        </p:spPr>
+        <p:style>
+          <a:lnRef idx="2">
+            <a:schemeClr val="accent1">
+              <a:shade val="15000"/>
+            </a:schemeClr>
+          </a:lnRef>
+          <a:fillRef idx="1">
+            <a:schemeClr val="accent1"/>
+          </a:fillRef>
+          <a:effectRef idx="0">
+            <a:schemeClr val="accent1"/>
+          </a:effectRef>
+          <a:fontRef idx="minor">
+            <a:schemeClr val="lt1"/>
+          </a:fontRef>
+        </p:style>
+        <p:txBody>
+          <a:bodyPr rtlCol="0" anchor="ctr"/>
+          <a:lstStyle/>
+          <a:p>
+            <a:pPr algn="ctr"/>
             <a:endParaRPr lang="en-US"/>
           </a:p>
         </p:txBody>
       </p:sp>
       <p:sp>
         <p:nvSpPr>
-          <p:cNvPr id="3" name="Subtitle 2">
-            <a:extLst>
-              <a:ext uri="{FF2B5EF4-FFF2-40B4-BE49-F238E27FC236}">
-                <a16:creationId xmlns:a16="http://schemas.microsoft.com/office/drawing/2014/main" id="{F1F056CB-ADD8-A6F9-9F3E-59B6D307D853}"/>
-              </a:ext>
-            </a:extLst>
-          </p:cNvPr>
-          <p:cNvSpPr>
-            <a:spLocks noGrp="1"/>
-          </p:cNvSpPr>
-          <p:nvPr>
-            <p:ph type="subTitle" idx="1"/>
-          </p:nvPr>
-        </p:nvSpPr>
-        <p:spPr/>
-        <p:txBody>
-          <a:bodyPr/>
-          <a:lstStyle/>
-          <a:p>
+          <p:cNvPr id="7" name="Rectangle 6">
+            <a:extLst>
+              <a:ext uri="{FF2B5EF4-FFF2-40B4-BE49-F238E27FC236}">
+                <a16:creationId xmlns:a16="http://schemas.microsoft.com/office/drawing/2014/main" id="{7D996FB8-4E70-735E-057F-25CC85E10DBB}"/>
+              </a:ext>
+            </a:extLst>
+          </p:cNvPr>
+          <p:cNvSpPr/>
+          <p:nvPr/>
+        </p:nvSpPr>
+        <p:spPr>
+          <a:xfrm>
+            <a:off x="3197290" y="1461796"/>
+            <a:ext cx="4267200" cy="422988"/>
+          </a:xfrm>
+          <a:prstGeom prst="rect">
+            <a:avLst/>
+          </a:prstGeom>
+          <a:noFill/>
+        </p:spPr>
+        <p:style>
+          <a:lnRef idx="2">
+            <a:schemeClr val="accent1">
+              <a:shade val="15000"/>
+            </a:schemeClr>
+          </a:lnRef>
+          <a:fillRef idx="1">
+            <a:schemeClr val="accent1"/>
+          </a:fillRef>
+          <a:effectRef idx="0">
+            <a:schemeClr val="accent1"/>
+          </a:effectRef>
+          <a:fontRef idx="minor">
+            <a:schemeClr val="lt1"/>
+          </a:fontRef>
+        </p:style>
+        <p:txBody>
+          <a:bodyPr rtlCol="0" anchor="ctr"/>
+          <a:lstStyle/>
+          <a:p>
+            <a:pPr algn="ctr"/>
             <a:endParaRPr lang="en-US"/>
           </a:p>
         </p:txBody>
       </p:sp>
+      <p:cxnSp>
+        <p:nvCxnSpPr>
+          <p:cNvPr id="9" name="Straight Connector 8">
+            <a:extLst>
+              <a:ext uri="{FF2B5EF4-FFF2-40B4-BE49-F238E27FC236}">
+                <a16:creationId xmlns:a16="http://schemas.microsoft.com/office/drawing/2014/main" id="{F8E484EA-EE7D-F5D1-E022-D89EC36F834D}"/>
+              </a:ext>
+            </a:extLst>
+          </p:cNvPr>
+          <p:cNvCxnSpPr/>
+          <p:nvPr/>
+        </p:nvCxnSpPr>
+        <p:spPr>
+          <a:xfrm>
+            <a:off x="3309257" y="1524000"/>
+            <a:ext cx="0" cy="279918"/>
+          </a:xfrm>
+          <a:prstGeom prst="line">
+            <a:avLst/>
+          </a:prstGeom>
+        </p:spPr>
+        <p:style>
+          <a:lnRef idx="2">
+            <a:schemeClr val="dk1"/>
+          </a:lnRef>
+          <a:fillRef idx="0">
+            <a:schemeClr val="dk1"/>
+          </a:fillRef>
+          <a:effectRef idx="1">
+            <a:schemeClr val="dk1"/>
+          </a:effectRef>
+          <a:fontRef idx="minor">
+            <a:schemeClr val="tx1"/>
+          </a:fontRef>
+        </p:style>
+      </p:cxnSp>
+      <p:cxnSp>
+        <p:nvCxnSpPr>
+          <p:cNvPr id="13" name="Straight Arrow Connector 12">
+            <a:extLst>
+              <a:ext uri="{FF2B5EF4-FFF2-40B4-BE49-F238E27FC236}">
+                <a16:creationId xmlns:a16="http://schemas.microsoft.com/office/drawing/2014/main" id="{0F3D3E91-E3A6-6B80-A473-1301F70E7683}"/>
+              </a:ext>
+            </a:extLst>
+          </p:cNvPr>
+          <p:cNvCxnSpPr>
+            <a:cxnSpLocks/>
+            <a:endCxn id="7" idx="3"/>
+          </p:cNvCxnSpPr>
+          <p:nvPr/>
+        </p:nvCxnSpPr>
+        <p:spPr>
+          <a:xfrm flipH="1">
+            <a:off x="7464490" y="1082351"/>
+            <a:ext cx="1188098" cy="590939"/>
+          </a:xfrm>
+          <a:prstGeom prst="straightConnector1">
+            <a:avLst/>
+          </a:prstGeom>
+          <a:ln>
+            <a:tailEnd type="triangle"/>
+          </a:ln>
+        </p:spPr>
+        <p:style>
+          <a:lnRef idx="2">
+            <a:schemeClr val="accent2"/>
+          </a:lnRef>
+          <a:fillRef idx="0">
+            <a:schemeClr val="accent2"/>
+          </a:fillRef>
+          <a:effectRef idx="1">
+            <a:schemeClr val="accent2"/>
+          </a:effectRef>
+          <a:fontRef idx="minor">
+            <a:schemeClr val="tx1"/>
+          </a:fontRef>
+        </p:style>
+      </p:cxnSp>
+      <p:sp>
+        <p:nvSpPr>
+          <p:cNvPr id="14" name="TextBox 13">
+            <a:extLst>
+              <a:ext uri="{FF2B5EF4-FFF2-40B4-BE49-F238E27FC236}">
+                <a16:creationId xmlns:a16="http://schemas.microsoft.com/office/drawing/2014/main" id="{A30C5AA0-6425-5E7D-3C7C-8C034DC83F88}"/>
+              </a:ext>
+            </a:extLst>
+          </p:cNvPr>
+          <p:cNvSpPr txBox="1"/>
+          <p:nvPr/>
+        </p:nvSpPr>
+        <p:spPr>
+          <a:xfrm>
+            <a:off x="8652588" y="897685"/>
+            <a:ext cx="1947521" cy="369332"/>
+          </a:xfrm>
+          <a:prstGeom prst="rect">
+            <a:avLst/>
+          </a:prstGeom>
+          <a:noFill/>
+        </p:spPr>
+        <p:txBody>
+          <a:bodyPr wrap="none" rtlCol="0">
+            <a:spAutoFit/>
+          </a:bodyPr>
+          <a:lstStyle/>
+          <a:p>
+            <a:r>
+              <a:rPr lang="en-US"/>
+              <a:t>Empty search box</a:t>
+            </a:r>
+          </a:p>
+        </p:txBody>
+      </p:sp>
+      <p:sp>
+        <p:nvSpPr>
+          <p:cNvPr id="15" name="Rectangle 14">
+            <a:extLst>
+              <a:ext uri="{FF2B5EF4-FFF2-40B4-BE49-F238E27FC236}">
+                <a16:creationId xmlns:a16="http://schemas.microsoft.com/office/drawing/2014/main" id="{67F251D8-D630-F9E8-132A-FF3090F27AA7}"/>
+              </a:ext>
+            </a:extLst>
+          </p:cNvPr>
+          <p:cNvSpPr/>
+          <p:nvPr/>
+        </p:nvSpPr>
+        <p:spPr>
+          <a:xfrm>
+            <a:off x="3197290" y="2139820"/>
+            <a:ext cx="4267200" cy="3256384"/>
+          </a:xfrm>
+          <a:prstGeom prst="rect">
+            <a:avLst/>
+          </a:prstGeom>
+          <a:noFill/>
+        </p:spPr>
+        <p:style>
+          <a:lnRef idx="2">
+            <a:schemeClr val="accent1">
+              <a:shade val="15000"/>
+            </a:schemeClr>
+          </a:lnRef>
+          <a:fillRef idx="1">
+            <a:schemeClr val="accent1"/>
+          </a:fillRef>
+          <a:effectRef idx="0">
+            <a:schemeClr val="accent1"/>
+          </a:effectRef>
+          <a:fontRef idx="minor">
+            <a:schemeClr val="lt1"/>
+          </a:fontRef>
+        </p:style>
+        <p:txBody>
+          <a:bodyPr rtlCol="0" anchor="ctr"/>
+          <a:lstStyle/>
+          <a:p>
+            <a:pPr algn="ctr"/>
+            <a:endParaRPr lang="en-US"/>
+          </a:p>
+        </p:txBody>
+      </p:sp>
+      <p:cxnSp>
+        <p:nvCxnSpPr>
+          <p:cNvPr id="17" name="Straight Connector 16">
+            <a:extLst>
+              <a:ext uri="{FF2B5EF4-FFF2-40B4-BE49-F238E27FC236}">
+                <a16:creationId xmlns:a16="http://schemas.microsoft.com/office/drawing/2014/main" id="{D71F7658-C84B-9084-9A9A-37E18A2E1FAB}"/>
+              </a:ext>
+            </a:extLst>
+          </p:cNvPr>
+          <p:cNvCxnSpPr/>
+          <p:nvPr/>
+        </p:nvCxnSpPr>
+        <p:spPr>
+          <a:xfrm>
+            <a:off x="7228114" y="2139820"/>
+            <a:ext cx="0" cy="3256384"/>
+          </a:xfrm>
+          <a:prstGeom prst="line">
+            <a:avLst/>
+          </a:prstGeom>
+        </p:spPr>
+        <p:style>
+          <a:lnRef idx="2">
+            <a:schemeClr val="dk1"/>
+          </a:lnRef>
+          <a:fillRef idx="0">
+            <a:schemeClr val="dk1"/>
+          </a:fillRef>
+          <a:effectRef idx="1">
+            <a:schemeClr val="dk1"/>
+          </a:effectRef>
+          <a:fontRef idx="minor">
+            <a:schemeClr val="tx1"/>
+          </a:fontRef>
+        </p:style>
+      </p:cxnSp>
+      <p:cxnSp>
+        <p:nvCxnSpPr>
+          <p:cNvPr id="19" name="Straight Connector 18">
+            <a:extLst>
+              <a:ext uri="{FF2B5EF4-FFF2-40B4-BE49-F238E27FC236}">
+                <a16:creationId xmlns:a16="http://schemas.microsoft.com/office/drawing/2014/main" id="{C8326ACB-C462-E7E2-6C66-0B365652C358}"/>
+              </a:ext>
+            </a:extLst>
+          </p:cNvPr>
+          <p:cNvCxnSpPr/>
+          <p:nvPr/>
+        </p:nvCxnSpPr>
+        <p:spPr>
+          <a:xfrm>
+            <a:off x="7228114" y="2394857"/>
+            <a:ext cx="236376" cy="0"/>
+          </a:xfrm>
+          <a:prstGeom prst="line">
+            <a:avLst/>
+          </a:prstGeom>
+        </p:spPr>
+        <p:style>
+          <a:lnRef idx="2">
+            <a:schemeClr val="dk1"/>
+          </a:lnRef>
+          <a:fillRef idx="0">
+            <a:schemeClr val="dk1"/>
+          </a:fillRef>
+          <a:effectRef idx="1">
+            <a:schemeClr val="dk1"/>
+          </a:effectRef>
+          <a:fontRef idx="minor">
+            <a:schemeClr val="tx1"/>
+          </a:fontRef>
+        </p:style>
+      </p:cxnSp>
+      <p:cxnSp>
+        <p:nvCxnSpPr>
+          <p:cNvPr id="20" name="Straight Connector 19">
+            <a:extLst>
+              <a:ext uri="{FF2B5EF4-FFF2-40B4-BE49-F238E27FC236}">
+                <a16:creationId xmlns:a16="http://schemas.microsoft.com/office/drawing/2014/main" id="{843B6651-ACDE-2D01-5B0E-FACE215E2031}"/>
+              </a:ext>
+            </a:extLst>
+          </p:cNvPr>
+          <p:cNvCxnSpPr/>
+          <p:nvPr/>
+        </p:nvCxnSpPr>
+        <p:spPr>
+          <a:xfrm>
+            <a:off x="7228114" y="5159828"/>
+            <a:ext cx="236376" cy="0"/>
+          </a:xfrm>
+          <a:prstGeom prst="line">
+            <a:avLst/>
+          </a:prstGeom>
+        </p:spPr>
+        <p:style>
+          <a:lnRef idx="2">
+            <a:schemeClr val="dk1"/>
+          </a:lnRef>
+          <a:fillRef idx="0">
+            <a:schemeClr val="dk1"/>
+          </a:fillRef>
+          <a:effectRef idx="1">
+            <a:schemeClr val="dk1"/>
+          </a:effectRef>
+          <a:fontRef idx="minor">
+            <a:schemeClr val="tx1"/>
+          </a:fontRef>
+        </p:style>
+      </p:cxnSp>
+      <p:cxnSp>
+        <p:nvCxnSpPr>
+          <p:cNvPr id="21" name="Straight Connector 20">
+            <a:extLst>
+              <a:ext uri="{FF2B5EF4-FFF2-40B4-BE49-F238E27FC236}">
+                <a16:creationId xmlns:a16="http://schemas.microsoft.com/office/drawing/2014/main" id="{B4C576A6-502C-1789-3B3F-CF59EE01A5E8}"/>
+              </a:ext>
+            </a:extLst>
+          </p:cNvPr>
+          <p:cNvCxnSpPr>
+            <a:cxnSpLocks/>
+          </p:cNvCxnSpPr>
+          <p:nvPr/>
+        </p:nvCxnSpPr>
+        <p:spPr>
+          <a:xfrm>
+            <a:off x="7262326" y="5246747"/>
+            <a:ext cx="83976" cy="77755"/>
+          </a:xfrm>
+          <a:prstGeom prst="line">
+            <a:avLst/>
+          </a:prstGeom>
+        </p:spPr>
+        <p:style>
+          <a:lnRef idx="2">
+            <a:schemeClr val="dk1"/>
+          </a:lnRef>
+          <a:fillRef idx="0">
+            <a:schemeClr val="dk1"/>
+          </a:fillRef>
+          <a:effectRef idx="1">
+            <a:schemeClr val="dk1"/>
+          </a:effectRef>
+          <a:fontRef idx="minor">
+            <a:schemeClr val="tx1"/>
+          </a:fontRef>
+        </p:style>
+      </p:cxnSp>
+      <p:cxnSp>
+        <p:nvCxnSpPr>
+          <p:cNvPr id="23" name="Straight Connector 22">
+            <a:extLst>
+              <a:ext uri="{FF2B5EF4-FFF2-40B4-BE49-F238E27FC236}">
+                <a16:creationId xmlns:a16="http://schemas.microsoft.com/office/drawing/2014/main" id="{723CDDF0-6FB8-3378-8BA0-CE495D2C37CD}"/>
+              </a:ext>
+            </a:extLst>
+          </p:cNvPr>
+          <p:cNvCxnSpPr>
+            <a:cxnSpLocks/>
+          </p:cNvCxnSpPr>
+          <p:nvPr/>
+        </p:nvCxnSpPr>
+        <p:spPr>
+          <a:xfrm flipH="1">
+            <a:off x="7346302" y="5246747"/>
+            <a:ext cx="83976" cy="77755"/>
+          </a:xfrm>
+          <a:prstGeom prst="line">
+            <a:avLst/>
+          </a:prstGeom>
+        </p:spPr>
+        <p:style>
+          <a:lnRef idx="2">
+            <a:schemeClr val="dk1"/>
+          </a:lnRef>
+          <a:fillRef idx="0">
+            <a:schemeClr val="dk1"/>
+          </a:fillRef>
+          <a:effectRef idx="1">
+            <a:schemeClr val="dk1"/>
+          </a:effectRef>
+          <a:fontRef idx="minor">
+            <a:schemeClr val="tx1"/>
+          </a:fontRef>
+        </p:style>
+      </p:cxnSp>
+      <p:cxnSp>
+        <p:nvCxnSpPr>
+          <p:cNvPr id="24" name="Straight Connector 23">
+            <a:extLst>
+              <a:ext uri="{FF2B5EF4-FFF2-40B4-BE49-F238E27FC236}">
+                <a16:creationId xmlns:a16="http://schemas.microsoft.com/office/drawing/2014/main" id="{9F7E1728-7D86-E880-18C0-5274074E98E3}"/>
+              </a:ext>
+            </a:extLst>
+          </p:cNvPr>
+          <p:cNvCxnSpPr>
+            <a:cxnSpLocks/>
+          </p:cNvCxnSpPr>
+          <p:nvPr/>
+        </p:nvCxnSpPr>
+        <p:spPr>
+          <a:xfrm flipV="1">
+            <a:off x="7262326" y="2214131"/>
+            <a:ext cx="83976" cy="77755"/>
+          </a:xfrm>
+          <a:prstGeom prst="line">
+            <a:avLst/>
+          </a:prstGeom>
+        </p:spPr>
+        <p:style>
+          <a:lnRef idx="2">
+            <a:schemeClr val="dk1"/>
+          </a:lnRef>
+          <a:fillRef idx="0">
+            <a:schemeClr val="dk1"/>
+          </a:fillRef>
+          <a:effectRef idx="1">
+            <a:schemeClr val="dk1"/>
+          </a:effectRef>
+          <a:fontRef idx="minor">
+            <a:schemeClr val="tx1"/>
+          </a:fontRef>
+        </p:style>
+      </p:cxnSp>
+      <p:cxnSp>
+        <p:nvCxnSpPr>
+          <p:cNvPr id="25" name="Straight Connector 24">
+            <a:extLst>
+              <a:ext uri="{FF2B5EF4-FFF2-40B4-BE49-F238E27FC236}">
+                <a16:creationId xmlns:a16="http://schemas.microsoft.com/office/drawing/2014/main" id="{1D6FDE49-8E57-F625-ACFE-9F8BEF7FC08D}"/>
+              </a:ext>
+            </a:extLst>
+          </p:cNvPr>
+          <p:cNvCxnSpPr>
+            <a:cxnSpLocks/>
+          </p:cNvCxnSpPr>
+          <p:nvPr/>
+        </p:nvCxnSpPr>
+        <p:spPr>
+          <a:xfrm flipH="1" flipV="1">
+            <a:off x="7346302" y="2214131"/>
+            <a:ext cx="83976" cy="77755"/>
+          </a:xfrm>
+          <a:prstGeom prst="line">
+            <a:avLst/>
+          </a:prstGeom>
+        </p:spPr>
+        <p:style>
+          <a:lnRef idx="2">
+            <a:schemeClr val="dk1"/>
+          </a:lnRef>
+          <a:fillRef idx="0">
+            <a:schemeClr val="dk1"/>
+          </a:fillRef>
+          <a:effectRef idx="1">
+            <a:schemeClr val="dk1"/>
+          </a:effectRef>
+          <a:fontRef idx="minor">
+            <a:schemeClr val="tx1"/>
+          </a:fontRef>
+        </p:style>
+      </p:cxnSp>
+      <p:sp>
+        <p:nvSpPr>
+          <p:cNvPr id="26" name="TextBox 25">
+            <a:extLst>
+              <a:ext uri="{FF2B5EF4-FFF2-40B4-BE49-F238E27FC236}">
+                <a16:creationId xmlns:a16="http://schemas.microsoft.com/office/drawing/2014/main" id="{14DC5E10-F55C-D3D6-3009-CA8DA0563524}"/>
+              </a:ext>
+            </a:extLst>
+          </p:cNvPr>
+          <p:cNvSpPr txBox="1"/>
+          <p:nvPr/>
+        </p:nvSpPr>
+        <p:spPr>
+          <a:xfrm>
+            <a:off x="3240834" y="2190701"/>
+            <a:ext cx="3937513" cy="923330"/>
+          </a:xfrm>
+          <a:prstGeom prst="rect">
+            <a:avLst/>
+          </a:prstGeom>
+          <a:noFill/>
+        </p:spPr>
+        <p:txBody>
+          <a:bodyPr wrap="square" rtlCol="0">
+            <a:spAutoFit/>
+          </a:bodyPr>
+          <a:lstStyle/>
+          <a:p>
+            <a:r>
+              <a:rPr lang="en-US"/>
+              <a:t>Playlist 1</a:t>
+            </a:r>
+          </a:p>
+          <a:p>
+            <a:r>
+              <a:rPr lang="en-US"/>
+              <a:t>Playlist 2</a:t>
+            </a:r>
+          </a:p>
+          <a:p>
+            <a:r>
+              <a:rPr lang="en-US"/>
+              <a:t>Playlist 3</a:t>
+            </a:r>
+          </a:p>
+        </p:txBody>
+      </p:sp>
+      <p:sp>
+        <p:nvSpPr>
+          <p:cNvPr id="27" name="TextBox 26">
+            <a:extLst>
+              <a:ext uri="{FF2B5EF4-FFF2-40B4-BE49-F238E27FC236}">
+                <a16:creationId xmlns:a16="http://schemas.microsoft.com/office/drawing/2014/main" id="{9B427624-6BAD-3E04-09C1-60FC2FB65CA6}"/>
+              </a:ext>
+            </a:extLst>
+          </p:cNvPr>
+          <p:cNvSpPr txBox="1"/>
+          <p:nvPr/>
+        </p:nvSpPr>
+        <p:spPr>
+          <a:xfrm>
+            <a:off x="8652588" y="2652366"/>
+            <a:ext cx="1910908" cy="369332"/>
+          </a:xfrm>
+          <a:prstGeom prst="rect">
+            <a:avLst/>
+          </a:prstGeom>
+          <a:noFill/>
+        </p:spPr>
+        <p:txBody>
+          <a:bodyPr wrap="none" rtlCol="0">
+            <a:spAutoFit/>
+          </a:bodyPr>
+          <a:lstStyle/>
+          <a:p>
+            <a:r>
+              <a:rPr lang="en-US"/>
+              <a:t>All playlists listed</a:t>
+            </a:r>
+          </a:p>
+        </p:txBody>
+      </p:sp>
+      <p:cxnSp>
+        <p:nvCxnSpPr>
+          <p:cNvPr id="28" name="Straight Arrow Connector 27">
+            <a:extLst>
+              <a:ext uri="{FF2B5EF4-FFF2-40B4-BE49-F238E27FC236}">
+                <a16:creationId xmlns:a16="http://schemas.microsoft.com/office/drawing/2014/main" id="{9F655616-4290-4227-7B90-7697761EB781}"/>
+              </a:ext>
+            </a:extLst>
+          </p:cNvPr>
+          <p:cNvCxnSpPr>
+            <a:cxnSpLocks/>
+          </p:cNvCxnSpPr>
+          <p:nvPr/>
+        </p:nvCxnSpPr>
+        <p:spPr>
+          <a:xfrm flipH="1" flipV="1">
+            <a:off x="4618653" y="2649894"/>
+            <a:ext cx="4033935" cy="188167"/>
+          </a:xfrm>
+          <a:prstGeom prst="straightConnector1">
+            <a:avLst/>
+          </a:prstGeom>
+          <a:ln>
+            <a:tailEnd type="triangle"/>
+          </a:ln>
+        </p:spPr>
+        <p:style>
+          <a:lnRef idx="2">
+            <a:schemeClr val="accent2"/>
+          </a:lnRef>
+          <a:fillRef idx="0">
+            <a:schemeClr val="accent2"/>
+          </a:fillRef>
+          <a:effectRef idx="1">
+            <a:schemeClr val="accent2"/>
+          </a:effectRef>
+          <a:fontRef idx="minor">
+            <a:schemeClr val="tx1"/>
+          </a:fontRef>
+        </p:style>
+      </p:cxnSp>
     </p:spTree>
     <p:extLst>
       <p:ext uri="{BB962C8B-B14F-4D97-AF65-F5344CB8AC3E}">
         <p14:creationId xmlns:p14="http://schemas.microsoft.com/office/powerpoint/2010/main" val="4204844588"/>
+      </p:ext>
+    </p:extLst>
+  </p:cSld>
+  <p:clrMapOvr>
+    <a:masterClrMapping/>
+  </p:clrMapOvr>
+</p:sld>
+</file>
+
+<file path=ppt/slides/slide2.xml><?xml version="1.0" encoding="utf-8"?>
+<p:sld xmlns:a="http://schemas.openxmlformats.org/drawingml/2006/main" xmlns:r="http://schemas.openxmlformats.org/officeDocument/2006/relationships" xmlns:p="http://schemas.openxmlformats.org/presentationml/2006/main">
+  <p:cSld>
+    <p:spTree>
+      <p:nvGrpSpPr>
+        <p:cNvPr id="1" name="">
+          <a:extLst>
+            <a:ext uri="{FF2B5EF4-FFF2-40B4-BE49-F238E27FC236}">
+              <a16:creationId xmlns:a16="http://schemas.microsoft.com/office/drawing/2014/main" id="{C06DCE4F-3962-D9E0-9165-A1A8565E1807}"/>
+            </a:ext>
+          </a:extLst>
+        </p:cNvPr>
+        <p:cNvGrpSpPr/>
+        <p:nvPr/>
+      </p:nvGrpSpPr>
+      <p:grpSpPr>
+        <a:xfrm>
+          <a:off x="0" y="0"/>
+          <a:ext cx="0" cy="0"/>
+          <a:chOff x="0" y="0"/>
+          <a:chExt cx="0" cy="0"/>
+        </a:xfrm>
+      </p:grpSpPr>
+      <p:sp>
+        <p:nvSpPr>
+          <p:cNvPr id="4" name="TextBox 3">
+            <a:extLst>
+              <a:ext uri="{FF2B5EF4-FFF2-40B4-BE49-F238E27FC236}">
+                <a16:creationId xmlns:a16="http://schemas.microsoft.com/office/drawing/2014/main" id="{622A26FC-6E7D-9D9A-A3C9-5987CDFFFD97}"/>
+              </a:ext>
+            </a:extLst>
+          </p:cNvPr>
+          <p:cNvSpPr txBox="1"/>
+          <p:nvPr/>
+        </p:nvSpPr>
+        <p:spPr>
+          <a:xfrm>
+            <a:off x="738554" y="457200"/>
+            <a:ext cx="5326138" cy="369332"/>
+          </a:xfrm>
+          <a:prstGeom prst="rect">
+            <a:avLst/>
+          </a:prstGeom>
+          <a:noFill/>
+        </p:spPr>
+        <p:txBody>
+          <a:bodyPr wrap="none" rtlCol="0">
+            <a:spAutoFit/>
+          </a:bodyPr>
+          <a:lstStyle/>
+          <a:p>
+            <a:r>
+              <a:rPr lang="en-US"/>
+              <a:t>Initial screen (after login, which happens on startup)</a:t>
+            </a:r>
+          </a:p>
+        </p:txBody>
+      </p:sp>
+      <p:sp>
+        <p:nvSpPr>
+          <p:cNvPr id="5" name="Rectangle 4">
+            <a:extLst>
+              <a:ext uri="{FF2B5EF4-FFF2-40B4-BE49-F238E27FC236}">
+                <a16:creationId xmlns:a16="http://schemas.microsoft.com/office/drawing/2014/main" id="{8E578F5E-9A45-EFD5-3D16-F90448DF78EB}"/>
+              </a:ext>
+            </a:extLst>
+          </p:cNvPr>
+          <p:cNvSpPr/>
+          <p:nvPr/>
+        </p:nvSpPr>
+        <p:spPr>
+          <a:xfrm>
+            <a:off x="2729515" y="1132449"/>
+            <a:ext cx="5176624" cy="4593102"/>
+          </a:xfrm>
+          <a:prstGeom prst="rect">
+            <a:avLst/>
+          </a:prstGeom>
+          <a:noFill/>
+        </p:spPr>
+        <p:style>
+          <a:lnRef idx="2">
+            <a:schemeClr val="accent1">
+              <a:shade val="15000"/>
+            </a:schemeClr>
+          </a:lnRef>
+          <a:fillRef idx="1">
+            <a:schemeClr val="accent1"/>
+          </a:fillRef>
+          <a:effectRef idx="0">
+            <a:schemeClr val="accent1"/>
+          </a:effectRef>
+          <a:fontRef idx="minor">
+            <a:schemeClr val="lt1"/>
+          </a:fontRef>
+        </p:style>
+        <p:txBody>
+          <a:bodyPr rtlCol="0" anchor="ctr"/>
+          <a:lstStyle/>
+          <a:p>
+            <a:pPr algn="ctr"/>
+            <a:endParaRPr lang="en-US"/>
+          </a:p>
+        </p:txBody>
+      </p:sp>
+      <p:sp>
+        <p:nvSpPr>
+          <p:cNvPr id="7" name="Rectangle 6">
+            <a:extLst>
+              <a:ext uri="{FF2B5EF4-FFF2-40B4-BE49-F238E27FC236}">
+                <a16:creationId xmlns:a16="http://schemas.microsoft.com/office/drawing/2014/main" id="{597B1B45-EAF3-7C47-2E2D-5A736B71D8C2}"/>
+              </a:ext>
+            </a:extLst>
+          </p:cNvPr>
+          <p:cNvSpPr/>
+          <p:nvPr/>
+        </p:nvSpPr>
+        <p:spPr>
+          <a:xfrm>
+            <a:off x="3197290" y="1461796"/>
+            <a:ext cx="4267200" cy="422988"/>
+          </a:xfrm>
+          <a:prstGeom prst="rect">
+            <a:avLst/>
+          </a:prstGeom>
+          <a:noFill/>
+        </p:spPr>
+        <p:style>
+          <a:lnRef idx="2">
+            <a:schemeClr val="accent1">
+              <a:shade val="15000"/>
+            </a:schemeClr>
+          </a:lnRef>
+          <a:fillRef idx="1">
+            <a:schemeClr val="accent1"/>
+          </a:fillRef>
+          <a:effectRef idx="0">
+            <a:schemeClr val="accent1"/>
+          </a:effectRef>
+          <a:fontRef idx="minor">
+            <a:schemeClr val="lt1"/>
+          </a:fontRef>
+        </p:style>
+        <p:txBody>
+          <a:bodyPr rtlCol="0" anchor="ctr"/>
+          <a:lstStyle/>
+          <a:p>
+            <a:pPr algn="ctr"/>
+            <a:endParaRPr lang="en-US"/>
+          </a:p>
+        </p:txBody>
+      </p:sp>
+      <p:cxnSp>
+        <p:nvCxnSpPr>
+          <p:cNvPr id="13" name="Straight Arrow Connector 12">
+            <a:extLst>
+              <a:ext uri="{FF2B5EF4-FFF2-40B4-BE49-F238E27FC236}">
+                <a16:creationId xmlns:a16="http://schemas.microsoft.com/office/drawing/2014/main" id="{60F4FC22-EE62-D233-1964-CE817B512CD0}"/>
+              </a:ext>
+            </a:extLst>
+          </p:cNvPr>
+          <p:cNvCxnSpPr>
+            <a:cxnSpLocks/>
+            <a:endCxn id="7" idx="3"/>
+          </p:cNvCxnSpPr>
+          <p:nvPr/>
+        </p:nvCxnSpPr>
+        <p:spPr>
+          <a:xfrm flipH="1">
+            <a:off x="7464490" y="1082351"/>
+            <a:ext cx="1188098" cy="590939"/>
+          </a:xfrm>
+          <a:prstGeom prst="straightConnector1">
+            <a:avLst/>
+          </a:prstGeom>
+          <a:ln>
+            <a:tailEnd type="triangle"/>
+          </a:ln>
+        </p:spPr>
+        <p:style>
+          <a:lnRef idx="2">
+            <a:schemeClr val="accent2"/>
+          </a:lnRef>
+          <a:fillRef idx="0">
+            <a:schemeClr val="accent2"/>
+          </a:fillRef>
+          <a:effectRef idx="1">
+            <a:schemeClr val="accent2"/>
+          </a:effectRef>
+          <a:fontRef idx="minor">
+            <a:schemeClr val="tx1"/>
+          </a:fontRef>
+        </p:style>
+      </p:cxnSp>
+      <p:sp>
+        <p:nvSpPr>
+          <p:cNvPr id="14" name="TextBox 13">
+            <a:extLst>
+              <a:ext uri="{FF2B5EF4-FFF2-40B4-BE49-F238E27FC236}">
+                <a16:creationId xmlns:a16="http://schemas.microsoft.com/office/drawing/2014/main" id="{BD1AB973-08D4-7025-7B65-6FDAA4F9EF9F}"/>
+              </a:ext>
+            </a:extLst>
+          </p:cNvPr>
+          <p:cNvSpPr txBox="1"/>
+          <p:nvPr/>
+        </p:nvSpPr>
+        <p:spPr>
+          <a:xfrm>
+            <a:off x="8652589" y="897685"/>
+            <a:ext cx="3271933" cy="923330"/>
+          </a:xfrm>
+          <a:prstGeom prst="rect">
+            <a:avLst/>
+          </a:prstGeom>
+          <a:noFill/>
+        </p:spPr>
+        <p:txBody>
+          <a:bodyPr wrap="square" rtlCol="0">
+            <a:spAutoFit/>
+          </a:bodyPr>
+          <a:lstStyle/>
+          <a:p>
+            <a:r>
+              <a:rPr lang="en-US"/>
+              <a:t>Search executes on ENTER.</a:t>
+            </a:r>
+          </a:p>
+          <a:p>
+            <a:r>
+              <a:rPr lang="en-US"/>
+              <a:t>Future version will search as you type</a:t>
+            </a:r>
+          </a:p>
+        </p:txBody>
+      </p:sp>
+      <p:sp>
+        <p:nvSpPr>
+          <p:cNvPr id="15" name="Rectangle 14">
+            <a:extLst>
+              <a:ext uri="{FF2B5EF4-FFF2-40B4-BE49-F238E27FC236}">
+                <a16:creationId xmlns:a16="http://schemas.microsoft.com/office/drawing/2014/main" id="{77A2C3EC-DFFC-7735-64E4-EC8799BE9637}"/>
+              </a:ext>
+            </a:extLst>
+          </p:cNvPr>
+          <p:cNvSpPr/>
+          <p:nvPr/>
+        </p:nvSpPr>
+        <p:spPr>
+          <a:xfrm>
+            <a:off x="3197290" y="2139820"/>
+            <a:ext cx="4267200" cy="3256384"/>
+          </a:xfrm>
+          <a:prstGeom prst="rect">
+            <a:avLst/>
+          </a:prstGeom>
+          <a:noFill/>
+        </p:spPr>
+        <p:style>
+          <a:lnRef idx="2">
+            <a:schemeClr val="accent1">
+              <a:shade val="15000"/>
+            </a:schemeClr>
+          </a:lnRef>
+          <a:fillRef idx="1">
+            <a:schemeClr val="accent1"/>
+          </a:fillRef>
+          <a:effectRef idx="0">
+            <a:schemeClr val="accent1"/>
+          </a:effectRef>
+          <a:fontRef idx="minor">
+            <a:schemeClr val="lt1"/>
+          </a:fontRef>
+        </p:style>
+        <p:txBody>
+          <a:bodyPr rtlCol="0" anchor="ctr"/>
+          <a:lstStyle/>
+          <a:p>
+            <a:pPr algn="ctr"/>
+            <a:endParaRPr lang="en-US"/>
+          </a:p>
+        </p:txBody>
+      </p:sp>
+      <p:cxnSp>
+        <p:nvCxnSpPr>
+          <p:cNvPr id="17" name="Straight Connector 16">
+            <a:extLst>
+              <a:ext uri="{FF2B5EF4-FFF2-40B4-BE49-F238E27FC236}">
+                <a16:creationId xmlns:a16="http://schemas.microsoft.com/office/drawing/2014/main" id="{48190269-74EE-EAA3-4446-8DB38DF86A93}"/>
+              </a:ext>
+            </a:extLst>
+          </p:cNvPr>
+          <p:cNvCxnSpPr/>
+          <p:nvPr/>
+        </p:nvCxnSpPr>
+        <p:spPr>
+          <a:xfrm>
+            <a:off x="7228114" y="2139820"/>
+            <a:ext cx="0" cy="3256384"/>
+          </a:xfrm>
+          <a:prstGeom prst="line">
+            <a:avLst/>
+          </a:prstGeom>
+        </p:spPr>
+        <p:style>
+          <a:lnRef idx="2">
+            <a:schemeClr val="dk1"/>
+          </a:lnRef>
+          <a:fillRef idx="0">
+            <a:schemeClr val="dk1"/>
+          </a:fillRef>
+          <a:effectRef idx="1">
+            <a:schemeClr val="dk1"/>
+          </a:effectRef>
+          <a:fontRef idx="minor">
+            <a:schemeClr val="tx1"/>
+          </a:fontRef>
+        </p:style>
+      </p:cxnSp>
+      <p:cxnSp>
+        <p:nvCxnSpPr>
+          <p:cNvPr id="19" name="Straight Connector 18">
+            <a:extLst>
+              <a:ext uri="{FF2B5EF4-FFF2-40B4-BE49-F238E27FC236}">
+                <a16:creationId xmlns:a16="http://schemas.microsoft.com/office/drawing/2014/main" id="{1489B313-62CC-EEA2-25C3-B16E9435F3D7}"/>
+              </a:ext>
+            </a:extLst>
+          </p:cNvPr>
+          <p:cNvCxnSpPr/>
+          <p:nvPr/>
+        </p:nvCxnSpPr>
+        <p:spPr>
+          <a:xfrm>
+            <a:off x="7228114" y="2394857"/>
+            <a:ext cx="236376" cy="0"/>
+          </a:xfrm>
+          <a:prstGeom prst="line">
+            <a:avLst/>
+          </a:prstGeom>
+        </p:spPr>
+        <p:style>
+          <a:lnRef idx="2">
+            <a:schemeClr val="dk1"/>
+          </a:lnRef>
+          <a:fillRef idx="0">
+            <a:schemeClr val="dk1"/>
+          </a:fillRef>
+          <a:effectRef idx="1">
+            <a:schemeClr val="dk1"/>
+          </a:effectRef>
+          <a:fontRef idx="minor">
+            <a:schemeClr val="tx1"/>
+          </a:fontRef>
+        </p:style>
+      </p:cxnSp>
+      <p:cxnSp>
+        <p:nvCxnSpPr>
+          <p:cNvPr id="20" name="Straight Connector 19">
+            <a:extLst>
+              <a:ext uri="{FF2B5EF4-FFF2-40B4-BE49-F238E27FC236}">
+                <a16:creationId xmlns:a16="http://schemas.microsoft.com/office/drawing/2014/main" id="{B5D87BDC-C148-FEFF-0405-73BAC80098F3}"/>
+              </a:ext>
+            </a:extLst>
+          </p:cNvPr>
+          <p:cNvCxnSpPr/>
+          <p:nvPr/>
+        </p:nvCxnSpPr>
+        <p:spPr>
+          <a:xfrm>
+            <a:off x="7228114" y="5159828"/>
+            <a:ext cx="236376" cy="0"/>
+          </a:xfrm>
+          <a:prstGeom prst="line">
+            <a:avLst/>
+          </a:prstGeom>
+        </p:spPr>
+        <p:style>
+          <a:lnRef idx="2">
+            <a:schemeClr val="dk1"/>
+          </a:lnRef>
+          <a:fillRef idx="0">
+            <a:schemeClr val="dk1"/>
+          </a:fillRef>
+          <a:effectRef idx="1">
+            <a:schemeClr val="dk1"/>
+          </a:effectRef>
+          <a:fontRef idx="minor">
+            <a:schemeClr val="tx1"/>
+          </a:fontRef>
+        </p:style>
+      </p:cxnSp>
+      <p:cxnSp>
+        <p:nvCxnSpPr>
+          <p:cNvPr id="21" name="Straight Connector 20">
+            <a:extLst>
+              <a:ext uri="{FF2B5EF4-FFF2-40B4-BE49-F238E27FC236}">
+                <a16:creationId xmlns:a16="http://schemas.microsoft.com/office/drawing/2014/main" id="{AD89AEFA-A9B2-CA15-9DDC-30DA40051EAF}"/>
+              </a:ext>
+            </a:extLst>
+          </p:cNvPr>
+          <p:cNvCxnSpPr>
+            <a:cxnSpLocks/>
+          </p:cNvCxnSpPr>
+          <p:nvPr/>
+        </p:nvCxnSpPr>
+        <p:spPr>
+          <a:xfrm>
+            <a:off x="7262326" y="5246747"/>
+            <a:ext cx="83976" cy="77755"/>
+          </a:xfrm>
+          <a:prstGeom prst="line">
+            <a:avLst/>
+          </a:prstGeom>
+        </p:spPr>
+        <p:style>
+          <a:lnRef idx="2">
+            <a:schemeClr val="dk1"/>
+          </a:lnRef>
+          <a:fillRef idx="0">
+            <a:schemeClr val="dk1"/>
+          </a:fillRef>
+          <a:effectRef idx="1">
+            <a:schemeClr val="dk1"/>
+          </a:effectRef>
+          <a:fontRef idx="minor">
+            <a:schemeClr val="tx1"/>
+          </a:fontRef>
+        </p:style>
+      </p:cxnSp>
+      <p:cxnSp>
+        <p:nvCxnSpPr>
+          <p:cNvPr id="23" name="Straight Connector 22">
+            <a:extLst>
+              <a:ext uri="{FF2B5EF4-FFF2-40B4-BE49-F238E27FC236}">
+                <a16:creationId xmlns:a16="http://schemas.microsoft.com/office/drawing/2014/main" id="{02E96C77-3FF7-B80A-1B44-C2FE4F1B47DA}"/>
+              </a:ext>
+            </a:extLst>
+          </p:cNvPr>
+          <p:cNvCxnSpPr>
+            <a:cxnSpLocks/>
+          </p:cNvCxnSpPr>
+          <p:nvPr/>
+        </p:nvCxnSpPr>
+        <p:spPr>
+          <a:xfrm flipH="1">
+            <a:off x="7346302" y="5246747"/>
+            <a:ext cx="83976" cy="77755"/>
+          </a:xfrm>
+          <a:prstGeom prst="line">
+            <a:avLst/>
+          </a:prstGeom>
+        </p:spPr>
+        <p:style>
+          <a:lnRef idx="2">
+            <a:schemeClr val="dk1"/>
+          </a:lnRef>
+          <a:fillRef idx="0">
+            <a:schemeClr val="dk1"/>
+          </a:fillRef>
+          <a:effectRef idx="1">
+            <a:schemeClr val="dk1"/>
+          </a:effectRef>
+          <a:fontRef idx="minor">
+            <a:schemeClr val="tx1"/>
+          </a:fontRef>
+        </p:style>
+      </p:cxnSp>
+      <p:cxnSp>
+        <p:nvCxnSpPr>
+          <p:cNvPr id="24" name="Straight Connector 23">
+            <a:extLst>
+              <a:ext uri="{FF2B5EF4-FFF2-40B4-BE49-F238E27FC236}">
+                <a16:creationId xmlns:a16="http://schemas.microsoft.com/office/drawing/2014/main" id="{31D28863-09EB-2BC8-0F41-16722807D27A}"/>
+              </a:ext>
+            </a:extLst>
+          </p:cNvPr>
+          <p:cNvCxnSpPr>
+            <a:cxnSpLocks/>
+          </p:cNvCxnSpPr>
+          <p:nvPr/>
+        </p:nvCxnSpPr>
+        <p:spPr>
+          <a:xfrm flipV="1">
+            <a:off x="7262326" y="2214131"/>
+            <a:ext cx="83976" cy="77755"/>
+          </a:xfrm>
+          <a:prstGeom prst="line">
+            <a:avLst/>
+          </a:prstGeom>
+        </p:spPr>
+        <p:style>
+          <a:lnRef idx="2">
+            <a:schemeClr val="dk1"/>
+          </a:lnRef>
+          <a:fillRef idx="0">
+            <a:schemeClr val="dk1"/>
+          </a:fillRef>
+          <a:effectRef idx="1">
+            <a:schemeClr val="dk1"/>
+          </a:effectRef>
+          <a:fontRef idx="minor">
+            <a:schemeClr val="tx1"/>
+          </a:fontRef>
+        </p:style>
+      </p:cxnSp>
+      <p:cxnSp>
+        <p:nvCxnSpPr>
+          <p:cNvPr id="25" name="Straight Connector 24">
+            <a:extLst>
+              <a:ext uri="{FF2B5EF4-FFF2-40B4-BE49-F238E27FC236}">
+                <a16:creationId xmlns:a16="http://schemas.microsoft.com/office/drawing/2014/main" id="{8AC789FD-FC24-CD0F-260E-2D8F02FBC06F}"/>
+              </a:ext>
+            </a:extLst>
+          </p:cNvPr>
+          <p:cNvCxnSpPr>
+            <a:cxnSpLocks/>
+          </p:cNvCxnSpPr>
+          <p:nvPr/>
+        </p:nvCxnSpPr>
+        <p:spPr>
+          <a:xfrm flipH="1" flipV="1">
+            <a:off x="7346302" y="2214131"/>
+            <a:ext cx="83976" cy="77755"/>
+          </a:xfrm>
+          <a:prstGeom prst="line">
+            <a:avLst/>
+          </a:prstGeom>
+        </p:spPr>
+        <p:style>
+          <a:lnRef idx="2">
+            <a:schemeClr val="dk1"/>
+          </a:lnRef>
+          <a:fillRef idx="0">
+            <a:schemeClr val="dk1"/>
+          </a:fillRef>
+          <a:effectRef idx="1">
+            <a:schemeClr val="dk1"/>
+          </a:effectRef>
+          <a:fontRef idx="minor">
+            <a:schemeClr val="tx1"/>
+          </a:fontRef>
+        </p:style>
+      </p:cxnSp>
+      <p:sp>
+        <p:nvSpPr>
+          <p:cNvPr id="26" name="TextBox 25">
+            <a:extLst>
+              <a:ext uri="{FF2B5EF4-FFF2-40B4-BE49-F238E27FC236}">
+                <a16:creationId xmlns:a16="http://schemas.microsoft.com/office/drawing/2014/main" id="{8B0663F1-533A-08DB-3F8E-7580B8C3C599}"/>
+              </a:ext>
+            </a:extLst>
+          </p:cNvPr>
+          <p:cNvSpPr txBox="1"/>
+          <p:nvPr/>
+        </p:nvSpPr>
+        <p:spPr>
+          <a:xfrm>
+            <a:off x="3240834" y="2190701"/>
+            <a:ext cx="3937513" cy="1477328"/>
+          </a:xfrm>
+          <a:prstGeom prst="rect">
+            <a:avLst/>
+          </a:prstGeom>
+          <a:noFill/>
+        </p:spPr>
+        <p:txBody>
+          <a:bodyPr wrap="square" rtlCol="0">
+            <a:spAutoFit/>
+          </a:bodyPr>
+          <a:lstStyle/>
+          <a:p>
+            <a:r>
+              <a:rPr lang="en-US"/>
+              <a:t>History of Japan</a:t>
+            </a:r>
+          </a:p>
+          <a:p>
+            <a:r>
+              <a:rPr lang="en-US"/>
+              <a:t>Japanese Culture</a:t>
+            </a:r>
+          </a:p>
+          <a:p>
+            <a:r>
+              <a:rPr lang="en-US"/>
+              <a:t>Learn Japanese</a:t>
+            </a:r>
+          </a:p>
+          <a:p>
+            <a:r>
+              <a:rPr lang="en-US"/>
+              <a:t>Natural Japanese Conversation</a:t>
+            </a:r>
+          </a:p>
+          <a:p>
+            <a:endParaRPr lang="en-US"/>
+          </a:p>
+        </p:txBody>
+      </p:sp>
+      <p:sp>
+        <p:nvSpPr>
+          <p:cNvPr id="2" name="TextBox 1">
+            <a:extLst>
+              <a:ext uri="{FF2B5EF4-FFF2-40B4-BE49-F238E27FC236}">
+                <a16:creationId xmlns:a16="http://schemas.microsoft.com/office/drawing/2014/main" id="{BB8D898E-E3CB-A49D-788B-A40ED762365E}"/>
+              </a:ext>
+            </a:extLst>
+          </p:cNvPr>
+          <p:cNvSpPr txBox="1"/>
+          <p:nvPr/>
+        </p:nvSpPr>
+        <p:spPr>
+          <a:xfrm>
+            <a:off x="3197290" y="1483745"/>
+            <a:ext cx="742511" cy="369332"/>
+          </a:xfrm>
+          <a:prstGeom prst="rect">
+            <a:avLst/>
+          </a:prstGeom>
+          <a:noFill/>
+        </p:spPr>
+        <p:txBody>
+          <a:bodyPr wrap="none" rtlCol="0">
+            <a:spAutoFit/>
+          </a:bodyPr>
+          <a:lstStyle/>
+          <a:p>
+            <a:r>
+              <a:rPr lang="en-US"/>
+              <a:t>japan</a:t>
+            </a:r>
+          </a:p>
+        </p:txBody>
+      </p:sp>
+    </p:spTree>
+    <p:extLst>
+      <p:ext uri="{BB962C8B-B14F-4D97-AF65-F5344CB8AC3E}">
+        <p14:creationId xmlns:p14="http://schemas.microsoft.com/office/powerpoint/2010/main" val="100365081"/>
       </p:ext>
     </p:extLst>
   </p:cSld>

</xml_diff>